<commit_message>
Last version (I think). Includes changes requested by David Maniaci.
</commit_message>
<xml_diff>
--- a/Figures/ch2Figures/Alignment/Misalignment geometry.pptx
+++ b/Figures/ch2Figures/Alignment/Misalignment geometry.pptx
@@ -192,7 +192,7 @@
           <a:p>
             <a:fld id="{9B4BB317-A432-C54D-90D4-CF4BF11CB423}" type="datetimeFigureOut">
               <a:rPr lang="en-US" smtClean="0"/>
-              <a:t>8/22/15</a:t>
+              <a:t>6/25/17</a:t>
             </a:fld>
             <a:endParaRPr lang="en-US"/>
           </a:p>
@@ -729,7 +729,7 @@
           <a:p>
             <a:fld id="{88E43FEF-49B0-6F47-9FF2-191A97557FB0}" type="datetimeFigureOut">
               <a:rPr lang="en-US" smtClean="0"/>
-              <a:t>8/22/15</a:t>
+              <a:t>6/25/17</a:t>
             </a:fld>
             <a:endParaRPr lang="en-US"/>
           </a:p>
@@ -899,7 +899,7 @@
           <a:p>
             <a:fld id="{88E43FEF-49B0-6F47-9FF2-191A97557FB0}" type="datetimeFigureOut">
               <a:rPr lang="en-US" smtClean="0"/>
-              <a:t>8/22/15</a:t>
+              <a:t>6/25/17</a:t>
             </a:fld>
             <a:endParaRPr lang="en-US"/>
           </a:p>
@@ -1079,7 +1079,7 @@
           <a:p>
             <a:fld id="{88E43FEF-49B0-6F47-9FF2-191A97557FB0}" type="datetimeFigureOut">
               <a:rPr lang="en-US" smtClean="0"/>
-              <a:t>8/22/15</a:t>
+              <a:t>6/25/17</a:t>
             </a:fld>
             <a:endParaRPr lang="en-US"/>
           </a:p>
@@ -1249,7 +1249,7 @@
           <a:p>
             <a:fld id="{88E43FEF-49B0-6F47-9FF2-191A97557FB0}" type="datetimeFigureOut">
               <a:rPr lang="en-US" smtClean="0"/>
-              <a:t>8/22/15</a:t>
+              <a:t>6/25/17</a:t>
             </a:fld>
             <a:endParaRPr lang="en-US"/>
           </a:p>
@@ -1495,7 +1495,7 @@
           <a:p>
             <a:fld id="{88E43FEF-49B0-6F47-9FF2-191A97557FB0}" type="datetimeFigureOut">
               <a:rPr lang="en-US" smtClean="0"/>
-              <a:t>8/22/15</a:t>
+              <a:t>6/25/17</a:t>
             </a:fld>
             <a:endParaRPr lang="en-US"/>
           </a:p>
@@ -1783,7 +1783,7 @@
           <a:p>
             <a:fld id="{88E43FEF-49B0-6F47-9FF2-191A97557FB0}" type="datetimeFigureOut">
               <a:rPr lang="en-US" smtClean="0"/>
-              <a:t>8/22/15</a:t>
+              <a:t>6/25/17</a:t>
             </a:fld>
             <a:endParaRPr lang="en-US"/>
           </a:p>
@@ -2205,7 +2205,7 @@
           <a:p>
             <a:fld id="{88E43FEF-49B0-6F47-9FF2-191A97557FB0}" type="datetimeFigureOut">
               <a:rPr lang="en-US" smtClean="0"/>
-              <a:t>8/22/15</a:t>
+              <a:t>6/25/17</a:t>
             </a:fld>
             <a:endParaRPr lang="en-US"/>
           </a:p>
@@ -2323,7 +2323,7 @@
           <a:p>
             <a:fld id="{88E43FEF-49B0-6F47-9FF2-191A97557FB0}" type="datetimeFigureOut">
               <a:rPr lang="en-US" smtClean="0"/>
-              <a:t>8/22/15</a:t>
+              <a:t>6/25/17</a:t>
             </a:fld>
             <a:endParaRPr lang="en-US"/>
           </a:p>
@@ -2418,7 +2418,7 @@
           <a:p>
             <a:fld id="{88E43FEF-49B0-6F47-9FF2-191A97557FB0}" type="datetimeFigureOut">
               <a:rPr lang="en-US" smtClean="0"/>
-              <a:t>8/22/15</a:t>
+              <a:t>6/25/17</a:t>
             </a:fld>
             <a:endParaRPr lang="en-US"/>
           </a:p>
@@ -2695,7 +2695,7 @@
           <a:p>
             <a:fld id="{88E43FEF-49B0-6F47-9FF2-191A97557FB0}" type="datetimeFigureOut">
               <a:rPr lang="en-US" smtClean="0"/>
-              <a:t>8/22/15</a:t>
+              <a:t>6/25/17</a:t>
             </a:fld>
             <a:endParaRPr lang="en-US"/>
           </a:p>
@@ -2948,7 +2948,7 @@
           <a:p>
             <a:fld id="{88E43FEF-49B0-6F47-9FF2-191A97557FB0}" type="datetimeFigureOut">
               <a:rPr lang="en-US" smtClean="0"/>
-              <a:t>8/22/15</a:t>
+              <a:t>6/25/17</a:t>
             </a:fld>
             <a:endParaRPr lang="en-US"/>
           </a:p>
@@ -3161,7 +3161,7 @@
           <a:p>
             <a:fld id="{88E43FEF-49B0-6F47-9FF2-191A97557FB0}" type="datetimeFigureOut">
               <a:rPr lang="en-US" smtClean="0"/>
-              <a:t>8/22/15</a:t>
+              <a:t>6/25/17</a:t>
             </a:fld>
             <a:endParaRPr lang="en-US"/>
           </a:p>
@@ -4535,7 +4535,7 @@
           <p:spPr>
             <a:xfrm>
               <a:off x="6374890" y="5891615"/>
-              <a:ext cx="886878" cy="400110"/>
+              <a:ext cx="1106200" cy="400110"/>
             </a:xfrm>
             <a:prstGeom prst="rect">
               <a:avLst/>

</xml_diff>